<commit_message>
Second commit for the presentation
</commit_message>
<xml_diff>
--- a/Mobile Robot Navigation with Artificial Intelligence.pptx
+++ b/Mobile Robot Navigation with Artificial Intelligence.pptx
@@ -134,16 +134,32 @@
 </p:presentation>
 </file>
 
-<file path=ppt/revisionInfo.xml><?xml version="1.0" encoding="utf-8"?>
-<p1510:revInfo xmlns:a="http://schemas.openxmlformats.org/drawingml/2006/main" xmlns:r="http://schemas.openxmlformats.org/officeDocument/2006/relationships" xmlns:p1510="http://schemas.microsoft.com/office/powerpoint/2015/10/main">
-  <p1510:revLst>
-    <p1510:client id="{7CB73193-CA33-48F3-9D7C-668E5976CA9E}" v="14" dt="2022-02-08T22:08:58.127"/>
-  </p1510:revLst>
-</p1510:revInfo>
-</file>
-
 <file path=ppt/changesInfos/changesInfo1.xml><?xml version="1.0" encoding="utf-8"?>
 <pc:chgInfo xmlns:a="http://schemas.openxmlformats.org/drawingml/2006/main" xmlns:r="http://schemas.openxmlformats.org/officeDocument/2006/relationships" xmlns:ac="http://schemas.microsoft.com/office/drawing/2013/main/command" xmlns:pc="http://schemas.microsoft.com/office/powerpoint/2013/main/command">
+  <pc:docChgLst>
+    <pc:chgData name="Hazem Ibrahim" userId="948ac3c2-3724-47d4-b49b-0d0c35bdb932" providerId="ADAL" clId="{D63EB07F-2AEC-4DA5-AEB2-649DC2E5D023}"/>
+    <pc:docChg chg="modSld">
+      <pc:chgData name="Hazem Ibrahim" userId="948ac3c2-3724-47d4-b49b-0d0c35bdb932" providerId="ADAL" clId="{D63EB07F-2AEC-4DA5-AEB2-649DC2E5D023}" dt="2022-02-11T18:18:07.608" v="0" actId="20577"/>
+      <pc:docMkLst>
+        <pc:docMk/>
+      </pc:docMkLst>
+      <pc:sldChg chg="modSp mod">
+        <pc:chgData name="Hazem Ibrahim" userId="948ac3c2-3724-47d4-b49b-0d0c35bdb932" providerId="ADAL" clId="{D63EB07F-2AEC-4DA5-AEB2-649DC2E5D023}" dt="2022-02-11T18:18:07.608" v="0" actId="20577"/>
+        <pc:sldMkLst>
+          <pc:docMk/>
+          <pc:sldMk cId="4220841203" sldId="277"/>
+        </pc:sldMkLst>
+        <pc:spChg chg="mod">
+          <ac:chgData name="Hazem Ibrahim" userId="948ac3c2-3724-47d4-b49b-0d0c35bdb932" providerId="ADAL" clId="{D63EB07F-2AEC-4DA5-AEB2-649DC2E5D023}" dt="2022-02-11T18:18:07.608" v="0" actId="20577"/>
+          <ac:spMkLst>
+            <pc:docMk/>
+            <pc:sldMk cId="4220841203" sldId="277"/>
+            <ac:spMk id="15" creationId="{A13BE1C0-386B-47CB-BDCE-A24D9918AEEF}"/>
+          </ac:spMkLst>
+        </pc:spChg>
+      </pc:sldChg>
+    </pc:docChg>
+  </pc:docChgLst>
   <pc:docChgLst>
     <pc:chgData name="Hazem Ibrahim" userId="948ac3c2-3724-47d4-b49b-0d0c35bdb932" providerId="ADAL" clId="{7CB73193-CA33-48F3-9D7C-668E5976CA9E}"/>
     <pc:docChg chg="custSel addSld modSld sldOrd">
@@ -8205,7 +8221,7 @@
           <a:p>
             <a:fld id="{9410D272-305C-421E-A9EF-95D63D599B42}" type="datetimeFigureOut">
               <a:rPr lang="en-US" smtClean="0"/>
-              <a:t>2/8/2022</a:t>
+              <a:t>2/11/2022</a:t>
             </a:fld>
             <a:endParaRPr lang="en-US" dirty="0"/>
           </a:p>
@@ -8382,7 +8398,7 @@
           <a:p>
             <a:fld id="{05E16E63-7886-43BC-8DD4-4F14C3DD7360}" type="datetimeFigureOut">
               <a:rPr lang="en-US" smtClean="0"/>
-              <a:t>2/8/2022</a:t>
+              <a:t>2/11/2022</a:t>
             </a:fld>
             <a:endParaRPr lang="en-US" dirty="0"/>
           </a:p>
@@ -18274,14 +18290,13 @@
           <a:p>
             <a:r>
               <a:rPr lang="en-US" dirty="0"/>
-              <a:t>Open the Design Ideas pane for instant slide makeovers. </a:t>
+              <a:t>Open the Design Ideas pane for instant slide makeovers</a:t>
             </a:r>
-          </a:p>
-          <a:p>
             <a:r>
-              <a:rPr lang="en-US" dirty="0"/>
-              <a:t>When we have design ideas, we’ll show them to you right there. </a:t>
+              <a:rPr lang="en-US"/>
+              <a:t>. </a:t>
             </a:r>
+            <a:endParaRPr lang="en-US" dirty="0"/>
           </a:p>
         </p:txBody>
       </p:sp>
@@ -20708,15 +20723,6 @@
 </file>
 
 <file path=customXml/item2.xml><?xml version="1.0" encoding="utf-8"?>
-<?mso-contentType ?>
-<FormTemplates xmlns="http://schemas.microsoft.com/sharepoint/v3/contenttype/forms">
-  <Display>DocumentLibraryForm</Display>
-  <Edit>DocumentLibraryForm</Edit>
-  <New>DocumentLibraryForm</New>
-</FormTemplates>
-</file>
-
-<file path=customXml/item3.xml><?xml version="1.0" encoding="utf-8"?>
 <ct:contentTypeSchema xmlns:ct="http://schemas.microsoft.com/office/2006/metadata/contentType" xmlns:ma="http://schemas.microsoft.com/office/2006/metadata/properties/metaAttributes" ct:_="" ma:_="" ma:contentTypeName="Document" ma:contentTypeID="0x01010079F111ED35F8CC479449609E8A0923A6" ma:contentTypeVersion="20" ma:contentTypeDescription="Create a new document." ma:contentTypeScope="" ma:versionID="1267097ee5f5874adfcc408041ae252e">
   <xsd:schema xmlns:xsd="http://www.w3.org/2001/XMLSchema" xmlns:xs="http://www.w3.org/2001/XMLSchema" xmlns:p="http://schemas.microsoft.com/office/2006/metadata/properties" xmlns:ns1="http://schemas.microsoft.com/sharepoint/v3" xmlns:ns2="71af3243-3dd4-4a8d-8c0d-dd76da1f02a5" xmlns:ns3="16c05727-aa75-4e4a-9b5f-8a80a1165891" xmlns:ns4="230e9df3-be65-4c73-a93b-d1236ebd677e" targetNamespace="http://schemas.microsoft.com/office/2006/metadata/properties" ma:root="true" ma:fieldsID="395891a93df65b14727750f2c06c306c" ns1:_="" ns2:_="" ns3:_="" ns4:_="">
     <xsd:import namespace="http://schemas.microsoft.com/sharepoint/v3"/>
@@ -20992,6 +20998,15 @@
 </ct:contentTypeSchema>
 </file>
 
+<file path=customXml/item3.xml><?xml version="1.0" encoding="utf-8"?>
+<?mso-contentType ?>
+<FormTemplates xmlns="http://schemas.microsoft.com/sharepoint/v3/contenttype/forms">
+  <Display>DocumentLibraryForm</Display>
+  <Edit>DocumentLibraryForm</Edit>
+  <New>DocumentLibraryForm</New>
+</FormTemplates>
+</file>
+
 <file path=customXml/itemProps1.xml><?xml version="1.0" encoding="utf-8"?>
 <ds:datastoreItem xmlns:ds="http://schemas.openxmlformats.org/officeDocument/2006/customXml" ds:itemID="{08757C30-AE9A-4680-90EB-19D282EC2B7C}">
   <ds:schemaRefs>
@@ -21005,14 +21020,6 @@
 </file>
 
 <file path=customXml/itemProps2.xml><?xml version="1.0" encoding="utf-8"?>
-<ds:datastoreItem xmlns:ds="http://schemas.openxmlformats.org/officeDocument/2006/customXml" ds:itemID="{A5CCB28C-7D26-4A36-9CFC-D739C28F3D18}">
-  <ds:schemaRefs>
-    <ds:schemaRef ds:uri="http://schemas.microsoft.com/sharepoint/v3/contenttype/forms"/>
-  </ds:schemaRefs>
-</ds:datastoreItem>
-</file>
-
-<file path=customXml/itemProps3.xml><?xml version="1.0" encoding="utf-8"?>
 <ds:datastoreItem xmlns:ds="http://schemas.openxmlformats.org/officeDocument/2006/customXml" ds:itemID="{0AF0BF08-C674-44E3-8BFC-85BC65E095F1}">
   <ds:schemaRefs>
     <ds:schemaRef ds:uri="http://schemas.microsoft.com/office/2006/metadata/contentType"/>
@@ -21033,6 +21040,14 @@
 </ds:datastoreItem>
 </file>
 
+<file path=customXml/itemProps3.xml><?xml version="1.0" encoding="utf-8"?>
+<ds:datastoreItem xmlns:ds="http://schemas.openxmlformats.org/officeDocument/2006/customXml" ds:itemID="{A5CCB28C-7D26-4A36-9CFC-D739C28F3D18}">
+  <ds:schemaRefs>
+    <ds:schemaRef ds:uri="http://schemas.microsoft.com/sharepoint/v3/contenttype/forms"/>
+  </ds:schemaRefs>
+</ds:datastoreItem>
+</file>
+
 <file path=docMetadata/LabelInfo.xml><?xml version="1.0" encoding="utf-8"?>
 <clbl:labelList xmlns:clbl="http://schemas.microsoft.com/office/2020/mipLabelMetadata">
   <clbl:label id="{f42aa342-8706-4288-bd11-ebb85995028c}" enabled="1" method="Standard" siteId="{72f988bf-86f1-41af-91ab-2d7cd011db47}" contentBits="0" removed="0"/>

</xml_diff>